<commit_message>
Make suggested ammendment from supervisor
</commit_message>
<xml_diff>
--- a/Poster/mid_project_poster.pptx
+++ b/Poster/mid_project_poster.pptx
@@ -243,7 +243,7 @@
           <a:p>
             <a:fld id="{A7FC89AA-5A10-4B81-9ED1-8351EF71A7E0}" type="datetimeFigureOut">
               <a:rPr lang="en-GB" smtClean="0"/>
-              <a:t>06/03/2017</a:t>
+              <a:t>07/03/2017</a:t>
             </a:fld>
             <a:endParaRPr lang="en-GB"/>
           </a:p>
@@ -413,7 +413,7 @@
           <a:p>
             <a:fld id="{A7FC89AA-5A10-4B81-9ED1-8351EF71A7E0}" type="datetimeFigureOut">
               <a:rPr lang="en-GB" smtClean="0"/>
-              <a:t>06/03/2017</a:t>
+              <a:t>07/03/2017</a:t>
             </a:fld>
             <a:endParaRPr lang="en-GB"/>
           </a:p>
@@ -593,7 +593,7 @@
           <a:p>
             <a:fld id="{A7FC89AA-5A10-4B81-9ED1-8351EF71A7E0}" type="datetimeFigureOut">
               <a:rPr lang="en-GB" smtClean="0"/>
-              <a:t>06/03/2017</a:t>
+              <a:t>07/03/2017</a:t>
             </a:fld>
             <a:endParaRPr lang="en-GB"/>
           </a:p>
@@ -763,7 +763,7 @@
           <a:p>
             <a:fld id="{A7FC89AA-5A10-4B81-9ED1-8351EF71A7E0}" type="datetimeFigureOut">
               <a:rPr lang="en-GB" smtClean="0"/>
-              <a:t>06/03/2017</a:t>
+              <a:t>07/03/2017</a:t>
             </a:fld>
             <a:endParaRPr lang="en-GB"/>
           </a:p>
@@ -1007,7 +1007,7 @@
           <a:p>
             <a:fld id="{A7FC89AA-5A10-4B81-9ED1-8351EF71A7E0}" type="datetimeFigureOut">
               <a:rPr lang="en-GB" smtClean="0"/>
-              <a:t>06/03/2017</a:t>
+              <a:t>07/03/2017</a:t>
             </a:fld>
             <a:endParaRPr lang="en-GB"/>
           </a:p>
@@ -1239,7 +1239,7 @@
           <a:p>
             <a:fld id="{A7FC89AA-5A10-4B81-9ED1-8351EF71A7E0}" type="datetimeFigureOut">
               <a:rPr lang="en-GB" smtClean="0"/>
-              <a:t>06/03/2017</a:t>
+              <a:t>07/03/2017</a:t>
             </a:fld>
             <a:endParaRPr lang="en-GB"/>
           </a:p>
@@ -1606,7 +1606,7 @@
           <a:p>
             <a:fld id="{A7FC89AA-5A10-4B81-9ED1-8351EF71A7E0}" type="datetimeFigureOut">
               <a:rPr lang="en-GB" smtClean="0"/>
-              <a:t>06/03/2017</a:t>
+              <a:t>07/03/2017</a:t>
             </a:fld>
             <a:endParaRPr lang="en-GB"/>
           </a:p>
@@ -1724,7 +1724,7 @@
           <a:p>
             <a:fld id="{A7FC89AA-5A10-4B81-9ED1-8351EF71A7E0}" type="datetimeFigureOut">
               <a:rPr lang="en-GB" smtClean="0"/>
-              <a:t>06/03/2017</a:t>
+              <a:t>07/03/2017</a:t>
             </a:fld>
             <a:endParaRPr lang="en-GB"/>
           </a:p>
@@ -1819,7 +1819,7 @@
           <a:p>
             <a:fld id="{A7FC89AA-5A10-4B81-9ED1-8351EF71A7E0}" type="datetimeFigureOut">
               <a:rPr lang="en-GB" smtClean="0"/>
-              <a:t>06/03/2017</a:t>
+              <a:t>07/03/2017</a:t>
             </a:fld>
             <a:endParaRPr lang="en-GB"/>
           </a:p>
@@ -2096,7 +2096,7 @@
           <a:p>
             <a:fld id="{A7FC89AA-5A10-4B81-9ED1-8351EF71A7E0}" type="datetimeFigureOut">
               <a:rPr lang="en-GB" smtClean="0"/>
-              <a:t>06/03/2017</a:t>
+              <a:t>07/03/2017</a:t>
             </a:fld>
             <a:endParaRPr lang="en-GB"/>
           </a:p>
@@ -2353,7 +2353,7 @@
           <a:p>
             <a:fld id="{A7FC89AA-5A10-4B81-9ED1-8351EF71A7E0}" type="datetimeFigureOut">
               <a:rPr lang="en-GB" smtClean="0"/>
-              <a:t>06/03/2017</a:t>
+              <a:t>07/03/2017</a:t>
             </a:fld>
             <a:endParaRPr lang="en-GB"/>
           </a:p>
@@ -2566,7 +2566,7 @@
           <a:p>
             <a:fld id="{A7FC89AA-5A10-4B81-9ED1-8351EF71A7E0}" type="datetimeFigureOut">
               <a:rPr lang="en-GB" smtClean="0"/>
-              <a:t>06/03/2017</a:t>
+              <a:t>07/03/2017</a:t>
             </a:fld>
             <a:endParaRPr lang="en-GB"/>
           </a:p>
@@ -3037,7 +3037,7 @@
         </p:nvSpPr>
         <p:spPr>
           <a:xfrm>
-            <a:off x="10707329" y="11445329"/>
+            <a:off x="10707329" y="11155046"/>
             <a:ext cx="10171471" cy="8799287"/>
           </a:xfrm>
           <a:prstGeom prst="roundRect">
@@ -3066,6 +3066,25 @@
           <a:p>
             <a:pPr algn="ctr"/>
             <a:r>
+              <a:rPr lang="en-GB" sz="3200" b="1" dirty="0">
+                <a:solidFill>
+                  <a:schemeClr val="bg1"/>
+                </a:solidFill>
+              </a:rPr>
+              <a:t>Technical Information</a:t>
+            </a:r>
+          </a:p>
+          <a:p>
+            <a:pPr algn="ctr"/>
+            <a:endParaRPr lang="en-GB" sz="2400" dirty="0">
+              <a:solidFill>
+                <a:schemeClr val="bg1"/>
+              </a:solidFill>
+            </a:endParaRPr>
+          </a:p>
+          <a:p>
+            <a:pPr algn="ctr"/>
+            <a:r>
               <a:rPr lang="en-GB" sz="2400" dirty="0">
                 <a:solidFill>
                   <a:schemeClr val="bg1"/>
@@ -3170,7 +3189,7 @@
         </p:nvSpPr>
         <p:spPr>
           <a:xfrm>
-            <a:off x="419099" y="20099473"/>
+            <a:off x="419099" y="19809190"/>
             <a:ext cx="10288228" cy="8799287"/>
           </a:xfrm>
           <a:prstGeom prst="roundRect">
@@ -3199,6 +3218,25 @@
           <a:p>
             <a:pPr algn="ctr"/>
             <a:r>
+              <a:rPr lang="en-GB" sz="3200" b="1" dirty="0">
+                <a:solidFill>
+                  <a:schemeClr val="bg1"/>
+                </a:solidFill>
+              </a:rPr>
+              <a:t>Future Work</a:t>
+            </a:r>
+          </a:p>
+          <a:p>
+            <a:pPr algn="ctr"/>
+            <a:endParaRPr lang="en-GB" sz="2400" dirty="0">
+              <a:solidFill>
+                <a:schemeClr val="bg1"/>
+              </a:solidFill>
+            </a:endParaRPr>
+          </a:p>
+          <a:p>
+            <a:pPr algn="ctr"/>
+            <a:r>
               <a:rPr lang="en-GB" sz="2400" dirty="0">
                 <a:solidFill>
                   <a:schemeClr val="bg1"/>
@@ -3274,7 +3312,7 @@
         </p:nvSpPr>
         <p:spPr>
           <a:xfrm>
-            <a:off x="419099" y="2675539"/>
+            <a:off x="419099" y="2385256"/>
             <a:ext cx="10288229" cy="8799287"/>
           </a:xfrm>
           <a:prstGeom prst="roundRect">
@@ -3303,12 +3341,31 @@
           <a:p>
             <a:pPr algn="ctr"/>
             <a:r>
+              <a:rPr lang="en-GB" sz="3200" b="1" dirty="0">
+                <a:solidFill>
+                  <a:schemeClr val="bg1"/>
+                </a:solidFill>
+              </a:rPr>
+              <a:t>Background and Introduction</a:t>
+            </a:r>
+          </a:p>
+          <a:p>
+            <a:pPr algn="ctr"/>
+            <a:endParaRPr lang="en-GB" sz="3200" b="1" dirty="0">
+              <a:solidFill>
+                <a:schemeClr val="bg1"/>
+              </a:solidFill>
+            </a:endParaRPr>
+          </a:p>
+          <a:p>
+            <a:pPr algn="ctr"/>
+            <a:r>
               <a:rPr lang="en-GB" sz="2400" dirty="0">
                 <a:solidFill>
                   <a:schemeClr val="bg1"/>
                 </a:solidFill>
               </a:rPr>
-              <a:t>This project is to produce real-time holograms with the Pepper’s Ghost technique originally used for theatre. The product will be used at Aberystwyth science week allowing the audience to create real-time holograms that can be viewed in a separate area of the room. The Pepper’s Ghost pyramid is an open square based pyramid normally made from Perspex or clear acrylic with sides angled 45 degrees from the normal. The video is positioned under each side of the pyramid and it is then reflected into the centre of the pyramid making a holographic illusion.</a:t>
+              <a:t>This project is to produce real-time holograms with the Pepper’s Ghost technique originally used for theatre. The product will be used at Aberystwyth science week allowing the audience to create real-time holograms that can be viewed in a separate area of the room. The Pepper’s Ghost pyramid is an open square based pyramid normally made from Perspex or clear acrylic with sides angled 45 degrees from the normal [1]. The video is positioned under each side of the pyramid and it is then reflected into the centre of the pyramid making a holographic illusion.</a:t>
             </a:r>
           </a:p>
           <a:p>
@@ -3359,16 +3416,15 @@
           </p:cNvPicPr>
           <p:nvPr/>
         </p:nvPicPr>
-        <p:blipFill>
+        <p:blipFill rotWithShape="1">
           <a:blip r:embed="rId2"/>
-          <a:stretch>
-            <a:fillRect/>
-          </a:stretch>
+          <a:srcRect b="8034"/>
+          <a:stretch/>
         </p:blipFill>
         <p:spPr>
           <a:xfrm>
-            <a:off x="1274507" y="12439167"/>
-            <a:ext cx="8655768" cy="6841108"/>
+            <a:off x="1274507" y="12472734"/>
+            <a:ext cx="8655768" cy="6291516"/>
           </a:xfrm>
           <a:prstGeom prst="rect">
             <a:avLst/>
@@ -3383,8 +3439,8 @@
         </p:nvSpPr>
         <p:spPr>
           <a:xfrm>
-            <a:off x="11500899" y="3652532"/>
-            <a:ext cx="8655768" cy="6845300"/>
+            <a:off x="11500899" y="4069941"/>
+            <a:ext cx="8655768" cy="5775657"/>
           </a:xfrm>
           <a:prstGeom prst="rect">
             <a:avLst/>
@@ -3433,7 +3489,7 @@
         </p:nvCxnSpPr>
         <p:spPr>
           <a:xfrm>
-            <a:off x="12620625" y="9096375"/>
+            <a:off x="12620625" y="8734425"/>
             <a:ext cx="6610350" cy="0"/>
           </a:xfrm>
           <a:prstGeom prst="line">
@@ -3466,7 +3522,7 @@
         </p:nvCxnSpPr>
         <p:spPr>
           <a:xfrm flipV="1">
-            <a:off x="14116050" y="5341620"/>
+            <a:off x="14116050" y="4979670"/>
             <a:ext cx="3810" cy="2657478"/>
           </a:xfrm>
           <a:prstGeom prst="line">
@@ -3499,7 +3555,7 @@
         </p:nvCxnSpPr>
         <p:spPr>
           <a:xfrm flipH="1">
-            <a:off x="14306550" y="5496375"/>
+            <a:off x="14306550" y="5134425"/>
             <a:ext cx="3609750" cy="3600000"/>
           </a:xfrm>
           <a:prstGeom prst="line">
@@ -3532,7 +3588,7 @@
         </p:nvCxnSpPr>
         <p:spPr>
           <a:xfrm flipV="1">
-            <a:off x="15859125" y="7784306"/>
+            <a:off x="15859125" y="7422356"/>
             <a:ext cx="14350" cy="1131094"/>
           </a:xfrm>
           <a:prstGeom prst="straightConnector1">
@@ -3567,7 +3623,7 @@
         </p:nvCxnSpPr>
         <p:spPr>
           <a:xfrm flipV="1">
-            <a:off x="16195675" y="7448775"/>
+            <a:off x="16195675" y="7086825"/>
             <a:ext cx="3810" cy="1466626"/>
           </a:xfrm>
           <a:prstGeom prst="straightConnector1">
@@ -3602,7 +3658,7 @@
         </p:nvCxnSpPr>
         <p:spPr>
           <a:xfrm flipH="1" flipV="1">
-            <a:off x="16515668" y="7136606"/>
+            <a:off x="16515668" y="6774656"/>
             <a:ext cx="12370" cy="1778795"/>
           </a:xfrm>
           <a:prstGeom prst="straightConnector1">
@@ -3637,7 +3693,7 @@
         </p:nvCxnSpPr>
         <p:spPr>
           <a:xfrm flipH="1" flipV="1">
-            <a:off x="16853062" y="6810375"/>
+            <a:off x="16853062" y="6448425"/>
             <a:ext cx="2539" cy="2105026"/>
           </a:xfrm>
           <a:prstGeom prst="straightConnector1">
@@ -3672,7 +3728,7 @@
         </p:nvCxnSpPr>
         <p:spPr>
           <a:xfrm flipH="1" flipV="1">
-            <a:off x="17168566" y="6488906"/>
+            <a:off x="17168566" y="6126956"/>
             <a:ext cx="17772" cy="2426495"/>
           </a:xfrm>
           <a:prstGeom prst="straightConnector1">
@@ -3707,7 +3763,7 @@
         </p:nvCxnSpPr>
         <p:spPr>
           <a:xfrm flipH="1" flipV="1">
-            <a:off x="17500726" y="6165282"/>
+            <a:off x="17500726" y="5803332"/>
             <a:ext cx="14288" cy="2750119"/>
           </a:xfrm>
           <a:prstGeom prst="straightConnector1">
@@ -3742,7 +3798,7 @@
         </p:nvCxnSpPr>
         <p:spPr>
           <a:xfrm flipH="1" flipV="1">
-            <a:off x="17831593" y="5819775"/>
+            <a:off x="17831593" y="5457825"/>
             <a:ext cx="15997" cy="3095628"/>
           </a:xfrm>
           <a:prstGeom prst="straightConnector1">
@@ -3777,7 +3833,7 @@
         </p:nvCxnSpPr>
         <p:spPr>
           <a:xfrm flipH="1" flipV="1">
-            <a:off x="15530573" y="8141735"/>
+            <a:off x="15530573" y="7779785"/>
             <a:ext cx="1015" cy="771523"/>
           </a:xfrm>
           <a:prstGeom prst="straightConnector1">
@@ -3812,7 +3868,7 @@
         </p:nvCxnSpPr>
         <p:spPr>
           <a:xfrm rot="16200000" flipV="1">
-            <a:off x="15088503" y="6977146"/>
+            <a:off x="15088503" y="6615196"/>
             <a:ext cx="14350" cy="1131094"/>
           </a:xfrm>
           <a:prstGeom prst="straightConnector1">
@@ -3847,7 +3903,7 @@
         </p:nvCxnSpPr>
         <p:spPr>
           <a:xfrm rot="16200000" flipV="1">
-            <a:off x="15259391" y="6478100"/>
+            <a:off x="15259391" y="6116150"/>
             <a:ext cx="3810" cy="1466626"/>
           </a:xfrm>
           <a:prstGeom prst="straightConnector1">
@@ -3882,7 +3938,7 @@
         </p:nvCxnSpPr>
         <p:spPr>
           <a:xfrm rot="16200000" flipH="1" flipV="1">
-            <a:off x="15413358" y="5997743"/>
+            <a:off x="15413358" y="5635793"/>
             <a:ext cx="12370" cy="1778795"/>
           </a:xfrm>
           <a:prstGeom prst="straightConnector1">
@@ -3917,7 +3973,7 @@
         </p:nvCxnSpPr>
         <p:spPr>
           <a:xfrm rot="16200000" flipH="1" flipV="1">
-            <a:off x="15581396" y="5502149"/>
+            <a:off x="15581396" y="5140199"/>
             <a:ext cx="2539" cy="2105026"/>
           </a:xfrm>
           <a:prstGeom prst="straightConnector1">
@@ -3952,7 +4008,7 @@
         </p:nvCxnSpPr>
         <p:spPr>
           <a:xfrm rot="16200000" flipH="1" flipV="1">
-            <a:off x="15734521" y="5018294"/>
+            <a:off x="15734521" y="4656344"/>
             <a:ext cx="17772" cy="2426495"/>
           </a:xfrm>
           <a:prstGeom prst="straightConnector1">
@@ -3987,7 +4043,7 @@
         </p:nvCxnSpPr>
         <p:spPr>
           <a:xfrm rot="16200000" flipH="1" flipV="1">
-            <a:off x="15895930" y="4526064"/>
+            <a:off x="15895930" y="4164114"/>
             <a:ext cx="14288" cy="2750119"/>
           </a:xfrm>
           <a:prstGeom prst="straightConnector1">
@@ -4022,7 +4078,7 @@
         </p:nvCxnSpPr>
         <p:spPr>
           <a:xfrm rot="16200000" flipH="1" flipV="1">
-            <a:off x="16065218" y="4021588"/>
+            <a:off x="16065218" y="3659638"/>
             <a:ext cx="15997" cy="3095628"/>
           </a:xfrm>
           <a:prstGeom prst="straightConnector1">
@@ -4057,7 +4113,7 @@
         </p:nvCxnSpPr>
         <p:spPr>
           <a:xfrm rot="16200000" flipH="1" flipV="1">
-            <a:off x="14913233" y="7492151"/>
+            <a:off x="14913233" y="7130201"/>
             <a:ext cx="1015" cy="771523"/>
           </a:xfrm>
           <a:prstGeom prst="straightConnector1">
@@ -4090,7 +4146,7 @@
         </p:nvSpPr>
         <p:spPr>
           <a:xfrm rot="16200000">
-            <a:off x="13144917" y="6356685"/>
+            <a:off x="13144917" y="5994735"/>
             <a:ext cx="1478335" cy="461665"/>
           </a:xfrm>
           <a:prstGeom prst="rect">
@@ -4120,7 +4176,7 @@
         </p:nvSpPr>
         <p:spPr>
           <a:xfrm>
-            <a:off x="16074612" y="9194853"/>
+            <a:off x="16074612" y="8832903"/>
             <a:ext cx="1146534" cy="461665"/>
           </a:xfrm>
           <a:prstGeom prst="rect">
@@ -4151,7 +4207,7 @@
         </p:nvSpPr>
         <p:spPr>
           <a:xfrm>
-            <a:off x="15530573" y="9022557"/>
+            <a:off x="15530573" y="8660607"/>
             <a:ext cx="2317017" cy="74295"/>
           </a:xfrm>
           <a:prstGeom prst="rect">
@@ -4188,13 +4244,12 @@
           <p:cNvPr id="77" name="Straight Connector 76"/>
           <p:cNvCxnSpPr>
             <a:cxnSpLocks/>
-            <a:endCxn id="11" idx="1"/>
           </p:cNvCxnSpPr>
           <p:nvPr/>
         </p:nvCxnSpPr>
         <p:spPr>
           <a:xfrm flipH="1" flipV="1">
-            <a:off x="11500899" y="7075182"/>
+            <a:off x="11500899" y="6727749"/>
             <a:ext cx="2049008" cy="2026068"/>
           </a:xfrm>
           <a:prstGeom prst="line">
@@ -4217,6 +4272,717 @@
           </a:fontRef>
         </p:style>
       </p:cxnSp>
+      <p:grpSp>
+        <p:nvGrpSpPr>
+          <p:cNvPr id="27" name="Group 26"/>
+          <p:cNvGrpSpPr/>
+          <p:nvPr/>
+        </p:nvGrpSpPr>
+        <p:grpSpPr>
+          <a:xfrm>
+            <a:off x="11564716" y="21054605"/>
+            <a:ext cx="9017000" cy="6070600"/>
+            <a:chOff x="11564716" y="21463816"/>
+            <a:chExt cx="9017000" cy="6070600"/>
+          </a:xfrm>
+        </p:grpSpPr>
+        <p:sp>
+          <p:nvSpPr>
+            <p:cNvPr id="2" name="Rectangle: Rounded Corners 1"/>
+            <p:cNvSpPr/>
+            <p:nvPr/>
+          </p:nvSpPr>
+          <p:spPr>
+            <a:xfrm>
+              <a:off x="11564716" y="21463816"/>
+              <a:ext cx="9017000" cy="6070600"/>
+            </a:xfrm>
+            <a:prstGeom prst="roundRect">
+              <a:avLst/>
+            </a:prstGeom>
+            <a:solidFill>
+              <a:schemeClr val="tx1"/>
+            </a:solidFill>
+            <a:ln>
+              <a:solidFill>
+                <a:schemeClr val="bg1">
+                  <a:lumMod val="65000"/>
+                </a:schemeClr>
+              </a:solidFill>
+            </a:ln>
+          </p:spPr>
+          <p:style>
+            <a:lnRef idx="2">
+              <a:schemeClr val="accent1">
+                <a:shade val="50000"/>
+              </a:schemeClr>
+            </a:lnRef>
+            <a:fillRef idx="1">
+              <a:schemeClr val="accent1"/>
+            </a:fillRef>
+            <a:effectRef idx="0">
+              <a:schemeClr val="accent1"/>
+            </a:effectRef>
+            <a:fontRef idx="minor">
+              <a:schemeClr val="lt1"/>
+            </a:fontRef>
+          </p:style>
+          <p:txBody>
+            <a:bodyPr rtlCol="0" anchor="ctr"/>
+            <a:lstStyle/>
+            <a:p>
+              <a:pPr algn="ctr"/>
+              <a:endParaRPr lang="en-GB"/>
+            </a:p>
+          </p:txBody>
+        </p:sp>
+        <p:sp>
+          <p:nvSpPr>
+            <p:cNvPr id="3" name="Rectangle 2"/>
+            <p:cNvSpPr/>
+            <p:nvPr/>
+          </p:nvSpPr>
+          <p:spPr>
+            <a:xfrm>
+              <a:off x="12404626" y="22288908"/>
+              <a:ext cx="7413597" cy="4420416"/>
+            </a:xfrm>
+            <a:prstGeom prst="rect">
+              <a:avLst/>
+            </a:prstGeom>
+            <a:solidFill>
+              <a:schemeClr val="accent1">
+                <a:lumMod val="40000"/>
+                <a:lumOff val="60000"/>
+              </a:schemeClr>
+            </a:solidFill>
+            <a:ln>
+              <a:solidFill>
+                <a:schemeClr val="bg1">
+                  <a:lumMod val="65000"/>
+                </a:schemeClr>
+              </a:solidFill>
+            </a:ln>
+          </p:spPr>
+          <p:style>
+            <a:lnRef idx="2">
+              <a:schemeClr val="accent1">
+                <a:shade val="50000"/>
+              </a:schemeClr>
+            </a:lnRef>
+            <a:fillRef idx="1">
+              <a:schemeClr val="accent1"/>
+            </a:fillRef>
+            <a:effectRef idx="0">
+              <a:schemeClr val="accent1"/>
+            </a:effectRef>
+            <a:fontRef idx="minor">
+              <a:schemeClr val="lt1"/>
+            </a:fontRef>
+          </p:style>
+          <p:txBody>
+            <a:bodyPr rtlCol="0" anchor="ctr"/>
+            <a:lstStyle/>
+            <a:p>
+              <a:pPr algn="ctr"/>
+              <a:endParaRPr lang="en-GB" dirty="0"/>
+            </a:p>
+          </p:txBody>
+        </p:sp>
+        <p:sp>
+          <p:nvSpPr>
+            <p:cNvPr id="5" name="Rectangle: Rounded Corners 4"/>
+            <p:cNvSpPr/>
+            <p:nvPr/>
+          </p:nvSpPr>
+          <p:spPr>
+            <a:xfrm>
+              <a:off x="20156667" y="24106686"/>
+              <a:ext cx="173493" cy="784860"/>
+            </a:xfrm>
+            <a:prstGeom prst="roundRect">
+              <a:avLst/>
+            </a:prstGeom>
+            <a:solidFill>
+              <a:schemeClr val="tx1">
+                <a:lumMod val="65000"/>
+                <a:lumOff val="35000"/>
+              </a:schemeClr>
+            </a:solidFill>
+            <a:ln>
+              <a:solidFill>
+                <a:schemeClr val="bg1">
+                  <a:lumMod val="85000"/>
+                </a:schemeClr>
+              </a:solidFill>
+            </a:ln>
+          </p:spPr>
+          <p:style>
+            <a:lnRef idx="2">
+              <a:schemeClr val="accent1">
+                <a:shade val="50000"/>
+              </a:schemeClr>
+            </a:lnRef>
+            <a:fillRef idx="1">
+              <a:schemeClr val="accent1"/>
+            </a:fillRef>
+            <a:effectRef idx="0">
+              <a:schemeClr val="accent1"/>
+            </a:effectRef>
+            <a:fontRef idx="minor">
+              <a:schemeClr val="lt1"/>
+            </a:fontRef>
+          </p:style>
+          <p:txBody>
+            <a:bodyPr rtlCol="0" anchor="ctr"/>
+            <a:lstStyle/>
+            <a:p>
+              <a:pPr algn="ctr"/>
+              <a:endParaRPr lang="en-GB"/>
+            </a:p>
+          </p:txBody>
+        </p:sp>
+        <p:sp>
+          <p:nvSpPr>
+            <p:cNvPr id="9" name="TextBox 8"/>
+            <p:cNvSpPr txBox="1"/>
+            <p:nvPr/>
+          </p:nvSpPr>
+          <p:spPr>
+            <a:xfrm>
+              <a:off x="12928600" y="22644100"/>
+              <a:ext cx="2490943" cy="923330"/>
+            </a:xfrm>
+            <a:prstGeom prst="rect">
+              <a:avLst/>
+            </a:prstGeom>
+            <a:noFill/>
+          </p:spPr>
+          <p:txBody>
+            <a:bodyPr wrap="square" rtlCol="0">
+              <a:spAutoFit/>
+            </a:bodyPr>
+            <a:lstStyle/>
+            <a:p>
+              <a:r>
+                <a:rPr lang="en-GB" dirty="0"/>
+                <a:t>Topic: Film and Book</a:t>
+              </a:r>
+            </a:p>
+            <a:p>
+              <a:r>
+                <a:rPr lang="en-GB" dirty="0"/>
+                <a:t>Words: 7</a:t>
+              </a:r>
+            </a:p>
+            <a:p>
+              <a:r>
+                <a:rPr lang="en-GB" dirty="0"/>
+                <a:t>Current word: 4</a:t>
+              </a:r>
+            </a:p>
+          </p:txBody>
+        </p:sp>
+        <p:cxnSp>
+          <p:nvCxnSpPr>
+            <p:cNvPr id="14" name="Straight Connector 13"/>
+            <p:cNvCxnSpPr/>
+            <p:nvPr/>
+          </p:nvCxnSpPr>
+          <p:spPr>
+            <a:xfrm>
+              <a:off x="13849350" y="24758650"/>
+              <a:ext cx="659267" cy="0"/>
+            </a:xfrm>
+            <a:prstGeom prst="line">
+              <a:avLst/>
+            </a:prstGeom>
+            <a:ln w="28575"/>
+          </p:spPr>
+          <p:style>
+            <a:lnRef idx="1">
+              <a:schemeClr val="accent1"/>
+            </a:lnRef>
+            <a:fillRef idx="0">
+              <a:schemeClr val="accent1"/>
+            </a:fillRef>
+            <a:effectRef idx="0">
+              <a:schemeClr val="accent1"/>
+            </a:effectRef>
+            <a:fontRef idx="minor">
+              <a:schemeClr val="tx1"/>
+            </a:fontRef>
+          </p:style>
+        </p:cxnSp>
+        <p:cxnSp>
+          <p:nvCxnSpPr>
+            <p:cNvPr id="38" name="Straight Connector 37"/>
+            <p:cNvCxnSpPr/>
+            <p:nvPr/>
+          </p:nvCxnSpPr>
+          <p:spPr>
+            <a:xfrm>
+              <a:off x="14700250" y="24758650"/>
+              <a:ext cx="659267" cy="0"/>
+            </a:xfrm>
+            <a:prstGeom prst="line">
+              <a:avLst/>
+            </a:prstGeom>
+            <a:ln w="28575"/>
+          </p:spPr>
+          <p:style>
+            <a:lnRef idx="1">
+              <a:schemeClr val="accent1"/>
+            </a:lnRef>
+            <a:fillRef idx="0">
+              <a:schemeClr val="accent1"/>
+            </a:fillRef>
+            <a:effectRef idx="0">
+              <a:schemeClr val="accent1"/>
+            </a:effectRef>
+            <a:fontRef idx="minor">
+              <a:schemeClr val="tx1"/>
+            </a:fontRef>
+          </p:style>
+        </p:cxnSp>
+        <p:cxnSp>
+          <p:nvCxnSpPr>
+            <p:cNvPr id="39" name="Straight Connector 38"/>
+            <p:cNvCxnSpPr/>
+            <p:nvPr/>
+          </p:nvCxnSpPr>
+          <p:spPr>
+            <a:xfrm>
+              <a:off x="15553275" y="24758650"/>
+              <a:ext cx="659267" cy="0"/>
+            </a:xfrm>
+            <a:prstGeom prst="line">
+              <a:avLst/>
+            </a:prstGeom>
+            <a:ln w="28575"/>
+          </p:spPr>
+          <p:style>
+            <a:lnRef idx="1">
+              <a:schemeClr val="accent1"/>
+            </a:lnRef>
+            <a:fillRef idx="0">
+              <a:schemeClr val="accent1"/>
+            </a:fillRef>
+            <a:effectRef idx="0">
+              <a:schemeClr val="accent1"/>
+            </a:effectRef>
+            <a:fontRef idx="minor">
+              <a:schemeClr val="tx1"/>
+            </a:fontRef>
+          </p:style>
+        </p:cxnSp>
+        <p:cxnSp>
+          <p:nvCxnSpPr>
+            <p:cNvPr id="40" name="Straight Connector 39"/>
+            <p:cNvCxnSpPr/>
+            <p:nvPr/>
+          </p:nvCxnSpPr>
+          <p:spPr>
+            <a:xfrm>
+              <a:off x="16369612" y="24758650"/>
+              <a:ext cx="659267" cy="0"/>
+            </a:xfrm>
+            <a:prstGeom prst="line">
+              <a:avLst/>
+            </a:prstGeom>
+            <a:ln w="28575"/>
+          </p:spPr>
+          <p:style>
+            <a:lnRef idx="1">
+              <a:schemeClr val="accent1"/>
+            </a:lnRef>
+            <a:fillRef idx="0">
+              <a:schemeClr val="accent1"/>
+            </a:fillRef>
+            <a:effectRef idx="0">
+              <a:schemeClr val="accent1"/>
+            </a:effectRef>
+            <a:fontRef idx="minor">
+              <a:schemeClr val="tx1"/>
+            </a:fontRef>
+          </p:style>
+        </p:cxnSp>
+        <p:cxnSp>
+          <p:nvCxnSpPr>
+            <p:cNvPr id="41" name="Straight Connector 40"/>
+            <p:cNvCxnSpPr/>
+            <p:nvPr/>
+          </p:nvCxnSpPr>
+          <p:spPr>
+            <a:xfrm>
+              <a:off x="17176750" y="24758650"/>
+              <a:ext cx="659267" cy="0"/>
+            </a:xfrm>
+            <a:prstGeom prst="line">
+              <a:avLst/>
+            </a:prstGeom>
+            <a:ln w="28575"/>
+          </p:spPr>
+          <p:style>
+            <a:lnRef idx="1">
+              <a:schemeClr val="accent1"/>
+            </a:lnRef>
+            <a:fillRef idx="0">
+              <a:schemeClr val="accent1"/>
+            </a:fillRef>
+            <a:effectRef idx="0">
+              <a:schemeClr val="accent1"/>
+            </a:effectRef>
+            <a:fontRef idx="minor">
+              <a:schemeClr val="tx1"/>
+            </a:fontRef>
+          </p:style>
+        </p:cxnSp>
+        <p:sp>
+          <p:nvSpPr>
+            <p:cNvPr id="17" name="Rectangle 16"/>
+            <p:cNvSpPr/>
+            <p:nvPr/>
+          </p:nvSpPr>
+          <p:spPr>
+            <a:xfrm>
+              <a:off x="12404626" y="25082500"/>
+              <a:ext cx="7413597" cy="1626824"/>
+            </a:xfrm>
+            <a:prstGeom prst="rect">
+              <a:avLst/>
+            </a:prstGeom>
+            <a:solidFill>
+              <a:schemeClr val="bg2">
+                <a:lumMod val="75000"/>
+              </a:schemeClr>
+            </a:solidFill>
+            <a:ln>
+              <a:solidFill>
+                <a:schemeClr val="bg2"/>
+              </a:solidFill>
+            </a:ln>
+          </p:spPr>
+          <p:style>
+            <a:lnRef idx="2">
+              <a:schemeClr val="accent1">
+                <a:shade val="50000"/>
+              </a:schemeClr>
+            </a:lnRef>
+            <a:fillRef idx="1">
+              <a:schemeClr val="accent1"/>
+            </a:fillRef>
+            <a:effectRef idx="0">
+              <a:schemeClr val="accent1"/>
+            </a:effectRef>
+            <a:fontRef idx="minor">
+              <a:schemeClr val="lt1"/>
+            </a:fontRef>
+          </p:style>
+          <p:txBody>
+            <a:bodyPr rtlCol="0" anchor="ctr"/>
+            <a:lstStyle/>
+            <a:p>
+              <a:pPr algn="ctr"/>
+              <a:endParaRPr lang="en-GB"/>
+            </a:p>
+          </p:txBody>
+        </p:sp>
+        <p:sp>
+          <p:nvSpPr>
+            <p:cNvPr id="18" name="Rectangle 17"/>
+            <p:cNvSpPr/>
+            <p:nvPr/>
+          </p:nvSpPr>
+          <p:spPr>
+            <a:xfrm>
+              <a:off x="12620625" y="25298400"/>
+              <a:ext cx="6975475" cy="1193122"/>
+            </a:xfrm>
+            <a:prstGeom prst="rect">
+              <a:avLst/>
+            </a:prstGeom>
+            <a:solidFill>
+              <a:schemeClr val="bg2">
+                <a:lumMod val="90000"/>
+              </a:schemeClr>
+            </a:solidFill>
+            <a:ln>
+              <a:solidFill>
+                <a:schemeClr val="bg2"/>
+              </a:solidFill>
+            </a:ln>
+          </p:spPr>
+          <p:style>
+            <a:lnRef idx="2">
+              <a:schemeClr val="accent1">
+                <a:shade val="50000"/>
+              </a:schemeClr>
+            </a:lnRef>
+            <a:fillRef idx="1">
+              <a:schemeClr val="accent1"/>
+            </a:fillRef>
+            <a:effectRef idx="0">
+              <a:schemeClr val="accent1"/>
+            </a:effectRef>
+            <a:fontRef idx="minor">
+              <a:schemeClr val="lt1"/>
+            </a:fontRef>
+          </p:style>
+          <p:txBody>
+            <a:bodyPr rtlCol="0" anchor="ctr"/>
+            <a:lstStyle/>
+            <a:p>
+              <a:pPr algn="ctr"/>
+              <a:r>
+                <a:rPr lang="en-GB" dirty="0"/>
+                <a:t>Keyboard</a:t>
+              </a:r>
+            </a:p>
+          </p:txBody>
+        </p:sp>
+        <p:sp>
+          <p:nvSpPr>
+            <p:cNvPr id="19" name="Rectangle 18"/>
+            <p:cNvSpPr/>
+            <p:nvPr/>
+          </p:nvSpPr>
+          <p:spPr>
+            <a:xfrm>
+              <a:off x="18554700" y="24244300"/>
+              <a:ext cx="1041400" cy="571500"/>
+            </a:xfrm>
+            <a:prstGeom prst="rect">
+              <a:avLst/>
+            </a:prstGeom>
+          </p:spPr>
+          <p:style>
+            <a:lnRef idx="2">
+              <a:schemeClr val="accent1">
+                <a:shade val="50000"/>
+              </a:schemeClr>
+            </a:lnRef>
+            <a:fillRef idx="1">
+              <a:schemeClr val="accent1"/>
+            </a:fillRef>
+            <a:effectRef idx="0">
+              <a:schemeClr val="accent1"/>
+            </a:effectRef>
+            <a:fontRef idx="minor">
+              <a:schemeClr val="lt1"/>
+            </a:fontRef>
+          </p:style>
+          <p:txBody>
+            <a:bodyPr rtlCol="0" anchor="ctr"/>
+            <a:lstStyle/>
+            <a:p>
+              <a:pPr algn="ctr"/>
+              <a:r>
+                <a:rPr lang="en-GB" dirty="0"/>
+                <a:t>Submit guess</a:t>
+              </a:r>
+            </a:p>
+          </p:txBody>
+        </p:sp>
+        <p:sp>
+          <p:nvSpPr>
+            <p:cNvPr id="24" name="TextBox 23"/>
+            <p:cNvSpPr txBox="1"/>
+            <p:nvPr/>
+          </p:nvSpPr>
+          <p:spPr>
+            <a:xfrm>
+              <a:off x="13849350" y="24176107"/>
+              <a:ext cx="406400" cy="707886"/>
+            </a:xfrm>
+            <a:prstGeom prst="rect">
+              <a:avLst/>
+            </a:prstGeom>
+            <a:noFill/>
+          </p:spPr>
+          <p:txBody>
+            <a:bodyPr wrap="square" rtlCol="0">
+              <a:spAutoFit/>
+            </a:bodyPr>
+            <a:lstStyle/>
+            <a:p>
+              <a:r>
+                <a:rPr lang="en-GB" sz="4000" dirty="0"/>
+                <a:t>W</a:t>
+              </a:r>
+              <a:endParaRPr lang="en-GB" dirty="0"/>
+            </a:p>
+          </p:txBody>
+        </p:sp>
+        <p:sp>
+          <p:nvSpPr>
+            <p:cNvPr id="25" name="TextBox 24"/>
+            <p:cNvSpPr txBox="1"/>
+            <p:nvPr/>
+          </p:nvSpPr>
+          <p:spPr>
+            <a:xfrm>
+              <a:off x="16635179" y="22588695"/>
+              <a:ext cx="2960921" cy="646331"/>
+            </a:xfrm>
+            <a:prstGeom prst="rect">
+              <a:avLst/>
+            </a:prstGeom>
+            <a:noFill/>
+          </p:spPr>
+          <p:txBody>
+            <a:bodyPr wrap="square" rtlCol="0">
+              <a:spAutoFit/>
+            </a:bodyPr>
+            <a:lstStyle/>
+            <a:p>
+              <a:r>
+                <a:rPr lang="en-GB" dirty="0"/>
+                <a:t>Time until round ends:    1:00</a:t>
+              </a:r>
+            </a:p>
+            <a:p>
+              <a:r>
+                <a:rPr lang="en-GB" dirty="0"/>
+                <a:t>Next letter revealed in:    0:05</a:t>
+              </a:r>
+            </a:p>
+          </p:txBody>
+        </p:sp>
+        <p:sp>
+          <p:nvSpPr>
+            <p:cNvPr id="26" name="TextBox 25"/>
+            <p:cNvSpPr txBox="1"/>
+            <p:nvPr/>
+          </p:nvSpPr>
+          <p:spPr>
+            <a:xfrm>
+              <a:off x="15725704" y="24231025"/>
+              <a:ext cx="486825" cy="584775"/>
+            </a:xfrm>
+            <a:prstGeom prst="rect">
+              <a:avLst/>
+            </a:prstGeom>
+            <a:noFill/>
+          </p:spPr>
+          <p:txBody>
+            <a:bodyPr wrap="square" rtlCol="0">
+              <a:spAutoFit/>
+            </a:bodyPr>
+            <a:lstStyle/>
+            <a:p>
+              <a:r>
+                <a:rPr lang="en-GB" sz="3200" dirty="0" err="1"/>
+                <a:t>i</a:t>
+              </a:r>
+              <a:endParaRPr lang="en-GB" sz="3200" dirty="0"/>
+            </a:p>
+          </p:txBody>
+        </p:sp>
+      </p:grpSp>
+      <p:sp>
+        <p:nvSpPr>
+          <p:cNvPr id="53" name="Rectangle: Rounded Corners 52"/>
+          <p:cNvSpPr/>
+          <p:nvPr/>
+        </p:nvSpPr>
+        <p:spPr>
+          <a:xfrm>
+            <a:off x="11529927" y="27357975"/>
+            <a:ext cx="9080817" cy="516074"/>
+          </a:xfrm>
+          <a:prstGeom prst="roundRect">
+            <a:avLst/>
+          </a:prstGeom>
+        </p:spPr>
+        <p:style>
+          <a:lnRef idx="2">
+            <a:schemeClr val="accent1">
+              <a:shade val="50000"/>
+            </a:schemeClr>
+          </a:lnRef>
+          <a:fillRef idx="1">
+            <a:schemeClr val="accent1"/>
+          </a:fillRef>
+          <a:effectRef idx="0">
+            <a:schemeClr val="accent1"/>
+          </a:effectRef>
+          <a:fontRef idx="minor">
+            <a:schemeClr val="lt1"/>
+          </a:fontRef>
+        </p:style>
+        <p:txBody>
+          <a:bodyPr rtlCol="0" anchor="ctr"/>
+          <a:lstStyle/>
+          <a:p>
+            <a:pPr algn="ctr"/>
+            <a:r>
+              <a:rPr lang="en-GB" sz="2400" dirty="0">
+                <a:solidFill>
+                  <a:schemeClr val="bg1"/>
+                </a:solidFill>
+              </a:rPr>
+              <a:t>Mock Design for Charades game android application</a:t>
+            </a:r>
+          </a:p>
+        </p:txBody>
+      </p:sp>
+      <p:sp>
+        <p:nvSpPr>
+          <p:cNvPr id="57" name="Rectangle: Rounded Corners 56"/>
+          <p:cNvSpPr/>
+          <p:nvPr/>
+        </p:nvSpPr>
+        <p:spPr>
+          <a:xfrm>
+            <a:off x="419099" y="28985470"/>
+            <a:ext cx="20459701" cy="917955"/>
+          </a:xfrm>
+          <a:prstGeom prst="roundRect">
+            <a:avLst/>
+          </a:prstGeom>
+        </p:spPr>
+        <p:style>
+          <a:lnRef idx="2">
+            <a:schemeClr val="accent1">
+              <a:shade val="50000"/>
+            </a:schemeClr>
+          </a:lnRef>
+          <a:fillRef idx="1">
+            <a:schemeClr val="accent1"/>
+          </a:fillRef>
+          <a:effectRef idx="0">
+            <a:schemeClr val="accent1"/>
+          </a:effectRef>
+          <a:fontRef idx="minor">
+            <a:schemeClr val="lt1"/>
+          </a:fontRef>
+        </p:style>
+        <p:txBody>
+          <a:bodyPr rtlCol="0" anchor="ctr"/>
+          <a:lstStyle/>
+          <a:p>
+            <a:pPr algn="ctr"/>
+            <a:r>
+              <a:rPr lang="en-GB" sz="2400" dirty="0">
+                <a:solidFill>
+                  <a:schemeClr val="bg1"/>
+                </a:solidFill>
+              </a:rPr>
+              <a:t>[1] B. Costa, “Explaining the Pepper’s Ghost illusion with Ray optics”, Comsol, 11 January 2016. Available: </a:t>
+            </a:r>
+            <a:r>
+              <a:rPr lang="en-GB" sz="2400" dirty="0"/>
+              <a:t>https://www.comsol.nl/blogs/explaining-the-peppers-ghost-illusion-with-ray-optics/. [Accessed 05 03 2017].</a:t>
+            </a:r>
+            <a:endParaRPr lang="en-GB" sz="2400" dirty="0">
+              <a:solidFill>
+                <a:schemeClr val="bg1"/>
+              </a:solidFill>
+            </a:endParaRPr>
+          </a:p>
+        </p:txBody>
+      </p:sp>
     </p:spTree>
     <p:extLst>
       <p:ext uri="{BB962C8B-B14F-4D97-AF65-F5344CB8AC3E}">

</xml_diff>

<commit_message>
Update poster with green screen as future rather than current
</commit_message>
<xml_diff>
--- a/Poster/mid_project_poster.pptx
+++ b/Poster/mid_project_poster.pptx
@@ -3090,23 +3090,7 @@
                   <a:schemeClr val="bg1"/>
                 </a:solidFill>
               </a:rPr>
-              <a:t>The application for video processing is written in python 2.7 using the precompiled binaries for OpenCV 2.4. It consists of one package containing the </a:t>
-            </a:r>
-            <a:r>
-              <a:rPr lang="en-GB" sz="2400" dirty="0" err="1">
-                <a:solidFill>
-                  <a:schemeClr val="bg1"/>
-                </a:solidFill>
-              </a:rPr>
-              <a:t>VideoProcessor</a:t>
-            </a:r>
-            <a:r>
-              <a:rPr lang="en-GB" sz="2400" dirty="0">
-                <a:solidFill>
-                  <a:schemeClr val="bg1"/>
-                </a:solidFill>
-              </a:rPr>
-              <a:t> class that deals with the main workflow of the product. The other two modules, contain helper functions and parsers for variables. </a:t>
+              <a:t>The application for video processing is written in python 2.7 using the precompiled binaries for OpenCV 2.4. It consists of one package containing the VideoProcessor class that deals with the main workflow of the product. The other two modules, contain helper functions and parsers for variables which are used by the main class. </a:t>
             </a:r>
           </a:p>
           <a:p>
@@ -3125,7 +3109,7 @@
                   <a:schemeClr val="bg1"/>
                 </a:solidFill>
               </a:rPr>
-              <a:t>The application is currently being developed to use a background subtraction technique to ensure only the foreground object is displayed from the video feed. The technique being used for this is a green screen as the background which is then removed programmatically from the video frame. This, when complete will use the Chroma Key technique to change the background to black.</a:t>
+              <a:t>The application currently relies on a black background to get the desire impact for the hologram. The background is obtained by filming the actor with a black screen behind them. To improve the product, an initial background subtraction technique is being implemented to allow a green screen to be used as the background. Using a green screen would lead to a Chroma key algorithm to remove the background programmatically from the video frame. </a:t>
             </a:r>
           </a:p>
           <a:p>
@@ -3144,7 +3128,7 @@
                   <a:schemeClr val="bg1"/>
                 </a:solidFill>
               </a:rPr>
-              <a:t>The application is tested using the continuous integration tool Jenkins which at present runs tests unit tests  (using the </a:t>
+              <a:t>The application is tested using the continuous integration tool, Jenkins, which at present runs unit tests (using the </a:t>
             </a:r>
             <a:r>
               <a:rPr lang="en-GB" sz="2400" dirty="0" err="1">
@@ -3176,7 +3160,7 @@
                   <a:schemeClr val="bg1"/>
                 </a:solidFill>
               </a:rPr>
-              <a:t> tests to check that my code is compliant with the PEP8 programming standard, and a coverage test to ensure that unit tests cover as much of the code base as possible. </a:t>
+              <a:t> tests to check that the code is compliant with the PEP8 programming standard, and a coverage test to ensure that unit tests cover as much of the code base as possible. These tests are run once a new feature is developed, and they must pass before the code is merged with the functional system. </a:t>
             </a:r>
           </a:p>
         </p:txBody>
@@ -3189,8 +3173,8 @@
         </p:nvSpPr>
         <p:spPr>
           <a:xfrm>
-            <a:off x="419099" y="19809190"/>
-            <a:ext cx="10288228" cy="8799287"/>
+            <a:off x="419099" y="19392900"/>
+            <a:ext cx="10288228" cy="9215577"/>
           </a:xfrm>
           <a:prstGeom prst="roundRect">
             <a:avLst/>
@@ -3242,7 +3226,7 @@
                   <a:schemeClr val="bg1"/>
                 </a:solidFill>
               </a:rPr>
-              <a:t>A charades game to accompany the hologram will be developed. This will allow the actor in the staging area to choose a phrase and act it out in front of the camera. The data on the topic will then be passed to device in the viewing area and the hologram of the actor will be displayed to viewers. The viewers will then attempt to guess the phrase being acted and swap places with the actor if they guess correctly.</a:t>
+              <a:t>A charades game to accompany the hologram will be developed. This will allow the actor in the staging area to choose a phrase and act it out in front of the camera. The data on the topic will then be passed to devices in the viewing area and the hologram of the actor will be displayed to viewers. The viewers will then attempt to guess the phrase being acted and swap places with the actor if they guess correctly.</a:t>
             </a:r>
           </a:p>
           <a:p>
@@ -3261,7 +3245,7 @@
                   <a:schemeClr val="bg1"/>
                 </a:solidFill>
               </a:rPr>
-              <a:t>There are two key points for future development which are, improving the background subtraction and hosting the video feed online to allow it to be viewed on various devices at the same time.</a:t>
+              <a:t>There are two key points for future development which are: improving the background subtraction, and hosting the video feed online to allow it to be viewed on various devices at the same time.</a:t>
             </a:r>
           </a:p>
           <a:p>
@@ -3280,7 +3264,7 @@
                   <a:schemeClr val="bg1"/>
                 </a:solidFill>
               </a:rPr>
-              <a:t>The background subtraction is currently reliant on the green screen in order to work. However, using a combination of background subtraction techniques, it should be possible to take a picture of a static background and then remove it from each frame.</a:t>
+              <a:t>As mentioned above, the background subtraction is currently reliant upon a black background and, by the conclusion of this project, also be compatible with a green screen. However, using a combination of background subtraction techniques, it should be possible to take a picture of a static background and then remove it from each frame, leaving only the foreground (actor).</a:t>
             </a:r>
           </a:p>
           <a:p>
@@ -3365,7 +3349,7 @@
                   <a:schemeClr val="bg1"/>
                 </a:solidFill>
               </a:rPr>
-              <a:t>This project is to produce real-time holograms with the Pepper’s Ghost technique originally used for theatre. The product will be used at Aberystwyth science week allowing the audience to create real-time holograms that can be viewed in a separate area of the room. The Pepper’s Ghost pyramid is an open square based pyramid normally made from Perspex or clear acrylic with sides angled 45 degrees from the normal [1]. The video is positioned under each side of the pyramid and it is then reflected into the centre of the pyramid making a holographic illusion.</a:t>
+              <a:t>This project is to produce real-time holograms using the Pepper’s Ghost technique originally created for use in theatre productions. The product will be used at Aberystwyth science week allowing the audience to create real-time holograms that can be viewed using the Pepper’s Ghost pyramid. The pyramid is an open square based pyramid normally made from Perspex or clear acrylic with sides angled 45 degrees from the normal [1]. A video (or collection of images) is positioned under each side of the pyramid and is reflected into the centre of the pyramid making a holographic illusion.</a:t>
             </a:r>
           </a:p>
           <a:p>
@@ -3384,26 +3368,7 @@
                   <a:schemeClr val="bg1"/>
                 </a:solidFill>
               </a:rPr>
-              <a:t>At present, a system has been created to capture a video feed from a camera attached to a computer. This video feed is then processed which duplicates the video feed into four copies, and each copy is rotated to face in towards the centre of the pyramid. Finally, a video feed is positioned on each side of the pyramid.</a:t>
-            </a:r>
-          </a:p>
-          <a:p>
-            <a:pPr algn="ctr"/>
-            <a:endParaRPr lang="en-GB" sz="2400" dirty="0">
-              <a:solidFill>
-                <a:schemeClr val="bg1"/>
-              </a:solidFill>
-            </a:endParaRPr>
-          </a:p>
-          <a:p>
-            <a:pPr algn="ctr"/>
-            <a:r>
-              <a:rPr lang="en-GB" sz="2400" dirty="0">
-                <a:solidFill>
-                  <a:schemeClr val="bg1"/>
-                </a:solidFill>
-              </a:rPr>
-              <a:t>The system has a fully documented design and an accompanying test suite to ensure that the functionality is correct. </a:t>
+              <a:t>At present, a system has been created to capture a video feed from a camera attached to a computer. This video feed is then processed which duplicates the video feed into four copies, and positions them at each side of the pyramid. Lastly, each copy is rotated to face in towards the centre of the pyramid creating a hologram-like illusion in the centre of the pyramid. </a:t>
             </a:r>
           </a:p>
         </p:txBody>

</xml_diff>

<commit_message>
Grammar and spelling improvements to poster
</commit_message>
<xml_diff>
--- a/Poster/mid_project_poster.pptx
+++ b/Poster/mid_project_poster.pptx
@@ -3037,8 +3037,8 @@
         </p:nvSpPr>
         <p:spPr>
           <a:xfrm>
-            <a:off x="10707329" y="11155046"/>
-            <a:ext cx="10171471" cy="8799287"/>
+            <a:off x="10707329" y="10751437"/>
+            <a:ext cx="10171471" cy="9293893"/>
           </a:xfrm>
           <a:prstGeom prst="roundRect">
             <a:avLst/>
@@ -3090,7 +3090,7 @@
                   <a:schemeClr val="bg1"/>
                 </a:solidFill>
               </a:rPr>
-              <a:t>The application for video processing is written in python 2.7 using the precompiled binaries for OpenCV 2.4. It consists of one package containing the VideoProcessor class that deals with the main workflow of the product. The other two modules, contain helper functions and parsers for variables which are used by the main class. </a:t>
+              <a:t>The application for video processing is written in python 2.7 using the precompiled binaries for OpenCV 2.4. It consists of one package containing the VideoProcessor class that deals with the main workflow of the product, as well as two other modules; helper functions and parsers for input variables.</a:t>
             </a:r>
           </a:p>
           <a:p>
@@ -3109,7 +3109,7 @@
                   <a:schemeClr val="bg1"/>
                 </a:solidFill>
               </a:rPr>
-              <a:t>The application currently relies on a black background to get the desire impact for the hologram. The background is obtained by filming the actor with a black screen behind them. To improve the product, an initial background subtraction technique is being implemented to allow a green screen to be used as the background. Using a green screen would lead to a Chroma key algorithm to remove the background programmatically from the video frame. </a:t>
+              <a:t>The application currently relies on a black background to get the desired impact for the hologram. The black background is obtained by filming the actor in front of a black screen. To improve the product, an initial background subtraction technique is being implemented to allow a green screen to be used as the background. Using a green screen would allow for a Chroma key algorithm to remove the background programmatically from the video frame. This will lead to a more consistent black background being produced.</a:t>
             </a:r>
           </a:p>
           <a:p>
@@ -3160,7 +3160,7 @@
                   <a:schemeClr val="bg1"/>
                 </a:solidFill>
               </a:rPr>
-              <a:t> tests to check that the code is compliant with the PEP8 programming standard, and a coverage test to ensure that unit tests cover as much of the code base as possible. These tests are run once a new feature is developed, and they must pass before the code is merged with the functional system. </a:t>
+              <a:t> tests to check that the code is compliant with the PEP8 programming standard, and a coverage test to ensure that unit tests cover as much of the code base as possible. These tests are run every time a new feature is developed, and all tests must pass before the code is merged with the functional system. </a:t>
             </a:r>
           </a:p>
         </p:txBody>
@@ -3226,7 +3226,7 @@
                   <a:schemeClr val="bg1"/>
                 </a:solidFill>
               </a:rPr>
-              <a:t>A charades game to accompany the hologram will be developed. This will allow the actor in the staging area to choose a phrase and act it out in front of the camera. The data on the topic will then be passed to devices in the viewing area and the hologram of the actor will be displayed to viewers. The viewers will then attempt to guess the phrase being acted and swap places with the actor if they guess correctly.</a:t>
+              <a:t>A charades game to accompany the hologram will be developed. This will allow the actor in the staging area to choose a phrase and act it out in front of the camera. The data on the topic will then be passed to devices in the viewing area and the hologram of the actor will be displayed to the viewers. The viewers will then attempt to guess the phrase being acted and swap places with the actor if they guess correctly.</a:t>
             </a:r>
           </a:p>
           <a:p>
@@ -3245,7 +3245,7 @@
                   <a:schemeClr val="bg1"/>
                 </a:solidFill>
               </a:rPr>
-              <a:t>There are two key points for future development which are: improving the background subtraction, and hosting the video feed online to allow it to be viewed on various devices at the same time.</a:t>
+              <a:t>There are two key points for future development. These are, improving the background subtraction, and hosting the video feed online to allow it to be viewed on various devices at the same time.</a:t>
             </a:r>
           </a:p>
           <a:p>
@@ -3264,7 +3264,7 @@
                   <a:schemeClr val="bg1"/>
                 </a:solidFill>
               </a:rPr>
-              <a:t>As mentioned above, the background subtraction is currently reliant upon a black background and, by the conclusion of this project, also be compatible with a green screen. However, using a combination of background subtraction techniques, it should be possible to take a picture of a static background and then remove it from each frame, leaving only the foreground (actor).</a:t>
+              <a:t>As mentioned above, the background subtraction is currently reliant upon a black background and, by the conclusion of this project, will also be compatible with a green screen. However, using a combination of background subtraction techniques, it should be possible to take a picture of a static background and then remove it from each frame, leaving only the foreground (actor).</a:t>
             </a:r>
           </a:p>
           <a:p>
@@ -3283,7 +3283,7 @@
                   <a:schemeClr val="bg1"/>
                 </a:solidFill>
               </a:rPr>
-              <a:t>Currently the application is capable of outputting the processed video feed in various sizes and resolution. If the content was hosted online, this could mean that the hologram could be viewed on multiple device in different locations.</a:t>
+              <a:t>Currently the application is capable of outputting the processed video feed in various sizes and resolutions. If the content was hosted online, this could mean that the hologram could be viewed on multiple device in different locations simultaneously.</a:t>
             </a:r>
           </a:p>
         </p:txBody>
@@ -3349,7 +3349,7 @@
                   <a:schemeClr val="bg1"/>
                 </a:solidFill>
               </a:rPr>
-              <a:t>This project is to produce real-time holograms using the Pepper’s Ghost technique originally created for use in theatre productions. The product will be used at Aberystwyth science week allowing the audience to create real-time holograms that can be viewed using the Pepper’s Ghost pyramid. The pyramid is an open square based pyramid normally made from Perspex or clear acrylic with sides angled 45 degrees from the normal [1]. A video (or collection of images) is positioned under each side of the pyramid and is reflected into the centre of the pyramid making a holographic illusion.</a:t>
+              <a:t>This project is to produce real-time holograms using the Pepper’s Ghost technique originally created for use in theatre productions. The product will be used at Aberystwyth science week, enabling the audience to create real-time holograms that can be viewed using the Pepper’s Ghost pyramid. The pyramid is an open square based pyramid normally made from Perspex or clear acrylic, with sides angled 45 degrees from the normal [1]. A video (or collection of images) is positioned under each side of the pyramid and is reflected into the centre of the pyramid creating a holographic illusion.</a:t>
             </a:r>
           </a:p>
           <a:p>
@@ -3368,7 +3368,7 @@
                   <a:schemeClr val="bg1"/>
                 </a:solidFill>
               </a:rPr>
-              <a:t>At present, a system has been created to capture a video feed from a camera attached to a computer. This video feed is then processed which duplicates the video feed into four copies, and positions them at each side of the pyramid. Lastly, each copy is rotated to face in towards the centre of the pyramid creating a hologram-like illusion in the centre of the pyramid. </a:t>
+              <a:t>At present, a system has been created to capture a video feed from a camera attached to a computer. This video feed is then processed, which duplicates the video feed into four copies, and positions them at each side of the pyramid. Lastly, each copy is rotated to face in towards the centre of the pyramid creating a hologram-like illusion in the centre of the pyramid. </a:t>
             </a:r>
           </a:p>
         </p:txBody>
@@ -4437,7 +4437,7 @@
             <a:p>
               <a:r>
                 <a:rPr lang="en-GB" dirty="0"/>
-                <a:t>Words: 7</a:t>
+                <a:t>Words in phrase: 7</a:t>
               </a:r>
             </a:p>
             <a:p>
@@ -4803,7 +4803,7 @@
             <a:p>
               <a:r>
                 <a:rPr lang="en-GB" dirty="0"/>
-                <a:t>Time until round ends:    1:00</a:t>
+                <a:t>Time until round ends:    0:15</a:t>
               </a:r>
             </a:p>
             <a:p>

</xml_diff>

<commit_message>
Final draft copy of poster
</commit_message>
<xml_diff>
--- a/Poster/mid_project_poster.pptx
+++ b/Poster/mid_project_poster.pptx
@@ -243,7 +243,7 @@
           <a:p>
             <a:fld id="{A7FC89AA-5A10-4B81-9ED1-8351EF71A7E0}" type="datetimeFigureOut">
               <a:rPr lang="en-GB" smtClean="0"/>
-              <a:t>07/03/2017</a:t>
+              <a:t>08/03/2017</a:t>
             </a:fld>
             <a:endParaRPr lang="en-GB"/>
           </a:p>
@@ -413,7 +413,7 @@
           <a:p>
             <a:fld id="{A7FC89AA-5A10-4B81-9ED1-8351EF71A7E0}" type="datetimeFigureOut">
               <a:rPr lang="en-GB" smtClean="0"/>
-              <a:t>07/03/2017</a:t>
+              <a:t>08/03/2017</a:t>
             </a:fld>
             <a:endParaRPr lang="en-GB"/>
           </a:p>
@@ -593,7 +593,7 @@
           <a:p>
             <a:fld id="{A7FC89AA-5A10-4B81-9ED1-8351EF71A7E0}" type="datetimeFigureOut">
               <a:rPr lang="en-GB" smtClean="0"/>
-              <a:t>07/03/2017</a:t>
+              <a:t>08/03/2017</a:t>
             </a:fld>
             <a:endParaRPr lang="en-GB"/>
           </a:p>
@@ -763,7 +763,7 @@
           <a:p>
             <a:fld id="{A7FC89AA-5A10-4B81-9ED1-8351EF71A7E0}" type="datetimeFigureOut">
               <a:rPr lang="en-GB" smtClean="0"/>
-              <a:t>07/03/2017</a:t>
+              <a:t>08/03/2017</a:t>
             </a:fld>
             <a:endParaRPr lang="en-GB"/>
           </a:p>
@@ -1007,7 +1007,7 @@
           <a:p>
             <a:fld id="{A7FC89AA-5A10-4B81-9ED1-8351EF71A7E0}" type="datetimeFigureOut">
               <a:rPr lang="en-GB" smtClean="0"/>
-              <a:t>07/03/2017</a:t>
+              <a:t>08/03/2017</a:t>
             </a:fld>
             <a:endParaRPr lang="en-GB"/>
           </a:p>
@@ -1239,7 +1239,7 @@
           <a:p>
             <a:fld id="{A7FC89AA-5A10-4B81-9ED1-8351EF71A7E0}" type="datetimeFigureOut">
               <a:rPr lang="en-GB" smtClean="0"/>
-              <a:t>07/03/2017</a:t>
+              <a:t>08/03/2017</a:t>
             </a:fld>
             <a:endParaRPr lang="en-GB"/>
           </a:p>
@@ -1606,7 +1606,7 @@
           <a:p>
             <a:fld id="{A7FC89AA-5A10-4B81-9ED1-8351EF71A7E0}" type="datetimeFigureOut">
               <a:rPr lang="en-GB" smtClean="0"/>
-              <a:t>07/03/2017</a:t>
+              <a:t>08/03/2017</a:t>
             </a:fld>
             <a:endParaRPr lang="en-GB"/>
           </a:p>
@@ -1724,7 +1724,7 @@
           <a:p>
             <a:fld id="{A7FC89AA-5A10-4B81-9ED1-8351EF71A7E0}" type="datetimeFigureOut">
               <a:rPr lang="en-GB" smtClean="0"/>
-              <a:t>07/03/2017</a:t>
+              <a:t>08/03/2017</a:t>
             </a:fld>
             <a:endParaRPr lang="en-GB"/>
           </a:p>
@@ -1819,7 +1819,7 @@
           <a:p>
             <a:fld id="{A7FC89AA-5A10-4B81-9ED1-8351EF71A7E0}" type="datetimeFigureOut">
               <a:rPr lang="en-GB" smtClean="0"/>
-              <a:t>07/03/2017</a:t>
+              <a:t>08/03/2017</a:t>
             </a:fld>
             <a:endParaRPr lang="en-GB"/>
           </a:p>
@@ -2096,7 +2096,7 @@
           <a:p>
             <a:fld id="{A7FC89AA-5A10-4B81-9ED1-8351EF71A7E0}" type="datetimeFigureOut">
               <a:rPr lang="en-GB" smtClean="0"/>
-              <a:t>07/03/2017</a:t>
+              <a:t>08/03/2017</a:t>
             </a:fld>
             <a:endParaRPr lang="en-GB"/>
           </a:p>
@@ -2353,7 +2353,7 @@
           <a:p>
             <a:fld id="{A7FC89AA-5A10-4B81-9ED1-8351EF71A7E0}" type="datetimeFigureOut">
               <a:rPr lang="en-GB" smtClean="0"/>
-              <a:t>07/03/2017</a:t>
+              <a:t>08/03/2017</a:t>
             </a:fld>
             <a:endParaRPr lang="en-GB"/>
           </a:p>
@@ -2566,7 +2566,7 @@
           <a:p>
             <a:fld id="{A7FC89AA-5A10-4B81-9ED1-8351EF71A7E0}" type="datetimeFigureOut">
               <a:rPr lang="en-GB" smtClean="0"/>
-              <a:t>07/03/2017</a:t>
+              <a:t>08/03/2017</a:t>
             </a:fld>
             <a:endParaRPr lang="en-GB"/>
           </a:p>
@@ -3404,7 +3404,7 @@
         </p:nvSpPr>
         <p:spPr>
           <a:xfrm>
-            <a:off x="11500899" y="4069941"/>
+            <a:off x="11500899" y="3688941"/>
             <a:ext cx="8655768" cy="5775657"/>
           </a:xfrm>
           <a:prstGeom prst="rect">
@@ -3454,7 +3454,7 @@
         </p:nvCxnSpPr>
         <p:spPr>
           <a:xfrm>
-            <a:off x="12620625" y="8734425"/>
+            <a:off x="12620625" y="8353425"/>
             <a:ext cx="6610350" cy="0"/>
           </a:xfrm>
           <a:prstGeom prst="line">
@@ -3487,7 +3487,7 @@
         </p:nvCxnSpPr>
         <p:spPr>
           <a:xfrm flipV="1">
-            <a:off x="14116050" y="4979670"/>
+            <a:off x="14116050" y="4598670"/>
             <a:ext cx="3810" cy="2657478"/>
           </a:xfrm>
           <a:prstGeom prst="line">
@@ -3520,7 +3520,7 @@
         </p:nvCxnSpPr>
         <p:spPr>
           <a:xfrm flipH="1">
-            <a:off x="14306550" y="5134425"/>
+            <a:off x="14306550" y="4753425"/>
             <a:ext cx="3609750" cy="3600000"/>
           </a:xfrm>
           <a:prstGeom prst="line">
@@ -3553,7 +3553,7 @@
         </p:nvCxnSpPr>
         <p:spPr>
           <a:xfrm flipV="1">
-            <a:off x="15859125" y="7422356"/>
+            <a:off x="15859125" y="7041356"/>
             <a:ext cx="14350" cy="1131094"/>
           </a:xfrm>
           <a:prstGeom prst="straightConnector1">
@@ -3588,7 +3588,7 @@
         </p:nvCxnSpPr>
         <p:spPr>
           <a:xfrm flipV="1">
-            <a:off x="16195675" y="7086825"/>
+            <a:off x="16195675" y="6705825"/>
             <a:ext cx="3810" cy="1466626"/>
           </a:xfrm>
           <a:prstGeom prst="straightConnector1">
@@ -3623,7 +3623,7 @@
         </p:nvCxnSpPr>
         <p:spPr>
           <a:xfrm flipH="1" flipV="1">
-            <a:off x="16515668" y="6774656"/>
+            <a:off x="16515668" y="6393656"/>
             <a:ext cx="12370" cy="1778795"/>
           </a:xfrm>
           <a:prstGeom prst="straightConnector1">
@@ -3658,7 +3658,7 @@
         </p:nvCxnSpPr>
         <p:spPr>
           <a:xfrm flipH="1" flipV="1">
-            <a:off x="16853062" y="6448425"/>
+            <a:off x="16853062" y="6067425"/>
             <a:ext cx="2539" cy="2105026"/>
           </a:xfrm>
           <a:prstGeom prst="straightConnector1">
@@ -3693,7 +3693,7 @@
         </p:nvCxnSpPr>
         <p:spPr>
           <a:xfrm flipH="1" flipV="1">
-            <a:off x="17168566" y="6126956"/>
+            <a:off x="17168566" y="5745956"/>
             <a:ext cx="17772" cy="2426495"/>
           </a:xfrm>
           <a:prstGeom prst="straightConnector1">
@@ -3728,7 +3728,7 @@
         </p:nvCxnSpPr>
         <p:spPr>
           <a:xfrm flipH="1" flipV="1">
-            <a:off x="17500726" y="5803332"/>
+            <a:off x="17500726" y="5422332"/>
             <a:ext cx="14288" cy="2750119"/>
           </a:xfrm>
           <a:prstGeom prst="straightConnector1">
@@ -3763,7 +3763,7 @@
         </p:nvCxnSpPr>
         <p:spPr>
           <a:xfrm flipH="1" flipV="1">
-            <a:off x="17831593" y="5457825"/>
+            <a:off x="17831593" y="5076825"/>
             <a:ext cx="15997" cy="3095628"/>
           </a:xfrm>
           <a:prstGeom prst="straightConnector1">
@@ -3798,7 +3798,7 @@
         </p:nvCxnSpPr>
         <p:spPr>
           <a:xfrm flipH="1" flipV="1">
-            <a:off x="15530573" y="7779785"/>
+            <a:off x="15530573" y="7398785"/>
             <a:ext cx="1015" cy="771523"/>
           </a:xfrm>
           <a:prstGeom prst="straightConnector1">
@@ -3833,7 +3833,7 @@
         </p:nvCxnSpPr>
         <p:spPr>
           <a:xfrm rot="16200000" flipV="1">
-            <a:off x="15088503" y="6615196"/>
+            <a:off x="15088503" y="6234196"/>
             <a:ext cx="14350" cy="1131094"/>
           </a:xfrm>
           <a:prstGeom prst="straightConnector1">
@@ -3868,7 +3868,7 @@
         </p:nvCxnSpPr>
         <p:spPr>
           <a:xfrm rot="16200000" flipV="1">
-            <a:off x="15259391" y="6116150"/>
+            <a:off x="15259391" y="5735150"/>
             <a:ext cx="3810" cy="1466626"/>
           </a:xfrm>
           <a:prstGeom prst="straightConnector1">
@@ -3903,7 +3903,7 @@
         </p:nvCxnSpPr>
         <p:spPr>
           <a:xfrm rot="16200000" flipH="1" flipV="1">
-            <a:off x="15413358" y="5635793"/>
+            <a:off x="15413358" y="5254793"/>
             <a:ext cx="12370" cy="1778795"/>
           </a:xfrm>
           <a:prstGeom prst="straightConnector1">
@@ -3938,7 +3938,7 @@
         </p:nvCxnSpPr>
         <p:spPr>
           <a:xfrm rot="16200000" flipH="1" flipV="1">
-            <a:off x="15581396" y="5140199"/>
+            <a:off x="15581396" y="4759199"/>
             <a:ext cx="2539" cy="2105026"/>
           </a:xfrm>
           <a:prstGeom prst="straightConnector1">
@@ -3973,7 +3973,7 @@
         </p:nvCxnSpPr>
         <p:spPr>
           <a:xfrm rot="16200000" flipH="1" flipV="1">
-            <a:off x="15734521" y="4656344"/>
+            <a:off x="15734521" y="4275344"/>
             <a:ext cx="17772" cy="2426495"/>
           </a:xfrm>
           <a:prstGeom prst="straightConnector1">
@@ -4008,7 +4008,7 @@
         </p:nvCxnSpPr>
         <p:spPr>
           <a:xfrm rot="16200000" flipH="1" flipV="1">
-            <a:off x="15895930" y="4164114"/>
+            <a:off x="15895930" y="3783114"/>
             <a:ext cx="14288" cy="2750119"/>
           </a:xfrm>
           <a:prstGeom prst="straightConnector1">
@@ -4043,7 +4043,7 @@
         </p:nvCxnSpPr>
         <p:spPr>
           <a:xfrm rot="16200000" flipH="1" flipV="1">
-            <a:off x="16065218" y="3659638"/>
+            <a:off x="16065218" y="3278638"/>
             <a:ext cx="15997" cy="3095628"/>
           </a:xfrm>
           <a:prstGeom prst="straightConnector1">
@@ -4078,7 +4078,7 @@
         </p:nvCxnSpPr>
         <p:spPr>
           <a:xfrm rot="16200000" flipH="1" flipV="1">
-            <a:off x="14913233" y="7130201"/>
+            <a:off x="14913233" y="6749201"/>
             <a:ext cx="1015" cy="771523"/>
           </a:xfrm>
           <a:prstGeom prst="straightConnector1">
@@ -4111,7 +4111,7 @@
         </p:nvSpPr>
         <p:spPr>
           <a:xfrm rot="16200000">
-            <a:off x="13144917" y="5994735"/>
+            <a:off x="13144917" y="5613735"/>
             <a:ext cx="1478335" cy="461665"/>
           </a:xfrm>
           <a:prstGeom prst="rect">
@@ -4141,7 +4141,7 @@
         </p:nvSpPr>
         <p:spPr>
           <a:xfrm>
-            <a:off x="16074612" y="8832903"/>
+            <a:off x="16074612" y="8451903"/>
             <a:ext cx="1146534" cy="461665"/>
           </a:xfrm>
           <a:prstGeom prst="rect">
@@ -4172,7 +4172,7 @@
         </p:nvSpPr>
         <p:spPr>
           <a:xfrm>
-            <a:off x="15530573" y="8660607"/>
+            <a:off x="15530573" y="8279607"/>
             <a:ext cx="2317017" cy="74295"/>
           </a:xfrm>
           <a:prstGeom prst="rect">
@@ -4214,7 +4214,7 @@
         </p:nvCxnSpPr>
         <p:spPr>
           <a:xfrm flipH="1" flipV="1">
-            <a:off x="11500899" y="6727749"/>
+            <a:off x="11500899" y="6346749"/>
             <a:ext cx="2049008" cy="2026068"/>
           </a:xfrm>
           <a:prstGeom prst="line">

</xml_diff>